<commit_message>
final ppt(add testing result)
</commit_message>
<xml_diff>
--- a/P2P Video Chat Final.pptx
+++ b/P2P Video Chat Final.pptx
@@ -225,7 +225,18 @@
   </p:defaultTextStyle>
   <p:extLst>
     <p:ext uri="{EFAFB233-063F-42B5-8137-9DF3F51BA10A}">
-      <p15:sldGuideLst xmlns:p15="http://schemas.microsoft.com/office/powerpoint/2012/main" xmlns=""/>
+      <p15:sldGuideLst xmlns:p15="http://schemas.microsoft.com/office/powerpoint/2012/main">
+        <p15:guide id="1" orient="horz" pos="2160">
+          <p15:clr>
+            <a:srgbClr val="A4A3A4"/>
+          </p15:clr>
+        </p15:guide>
+        <p15:guide id="2" pos="2880">
+          <p15:clr>
+            <a:srgbClr val="A4A3A4"/>
+          </p15:clr>
+        </p15:guide>
+      </p15:sldGuideLst>
     </p:ext>
   </p:extLst>
 </p:presentation>
@@ -1155,7 +1166,7 @@
     </p:spTree>
     <p:extLst>
       <p:ext uri="{BB962C8B-B14F-4D97-AF65-F5344CB8AC3E}">
-        <p14:creationId xmlns:p14="http://schemas.microsoft.com/office/powerpoint/2010/main" xmlns="" val="1020703455"/>
+        <p14:creationId xmlns:p14="http://schemas.microsoft.com/office/powerpoint/2010/main" val="1020703455"/>
       </p:ext>
     </p:extLst>
   </p:cSld>
@@ -1483,7 +1494,7 @@
     </p:spTree>
     <p:extLst>
       <p:ext uri="{BB962C8B-B14F-4D97-AF65-F5344CB8AC3E}">
-        <p14:creationId xmlns:p14="http://schemas.microsoft.com/office/powerpoint/2010/main" xmlns="" val="863595949"/>
+        <p14:creationId xmlns:p14="http://schemas.microsoft.com/office/powerpoint/2010/main" val="863595949"/>
       </p:ext>
     </p:extLst>
   </p:cSld>
@@ -1589,7 +1600,7 @@
     </p:spTree>
     <p:extLst>
       <p:ext uri="{BB962C8B-B14F-4D97-AF65-F5344CB8AC3E}">
-        <p14:creationId xmlns:p14="http://schemas.microsoft.com/office/powerpoint/2010/main" xmlns="" val="1363546037"/>
+        <p14:creationId xmlns:p14="http://schemas.microsoft.com/office/powerpoint/2010/main" val="1363546037"/>
       </p:ext>
     </p:extLst>
   </p:cSld>
@@ -1695,7 +1706,7 @@
     </p:spTree>
     <p:extLst>
       <p:ext uri="{BB962C8B-B14F-4D97-AF65-F5344CB8AC3E}">
-        <p14:creationId xmlns:p14="http://schemas.microsoft.com/office/powerpoint/2010/main" xmlns="" val="1585615850"/>
+        <p14:creationId xmlns:p14="http://schemas.microsoft.com/office/powerpoint/2010/main" val="1585615850"/>
       </p:ext>
     </p:extLst>
   </p:cSld>
@@ -1794,14 +1805,14 @@
               </a:spcBef>
               <a:buNone/>
             </a:pPr>
-            <a:endParaRPr/>
+            <a:endParaRPr dirty="0"/>
           </a:p>
         </p:txBody>
       </p:sp>
     </p:spTree>
     <p:extLst>
       <p:ext uri="{BB962C8B-B14F-4D97-AF65-F5344CB8AC3E}">
-        <p14:creationId xmlns:p14="http://schemas.microsoft.com/office/powerpoint/2010/main" xmlns="" val="1618658203"/>
+        <p14:creationId xmlns:p14="http://schemas.microsoft.com/office/powerpoint/2010/main" val="1618658203"/>
       </p:ext>
     </p:extLst>
   </p:cSld>
@@ -1907,7 +1918,7 @@
     </p:spTree>
     <p:extLst>
       <p:ext uri="{BB962C8B-B14F-4D97-AF65-F5344CB8AC3E}">
-        <p14:creationId xmlns:p14="http://schemas.microsoft.com/office/powerpoint/2010/main" xmlns="" val="1680217354"/>
+        <p14:creationId xmlns:p14="http://schemas.microsoft.com/office/powerpoint/2010/main" val="1680217354"/>
       </p:ext>
     </p:extLst>
   </p:cSld>
@@ -2013,7 +2024,7 @@
     </p:spTree>
     <p:extLst>
       <p:ext uri="{BB962C8B-B14F-4D97-AF65-F5344CB8AC3E}">
-        <p14:creationId xmlns:p14="http://schemas.microsoft.com/office/powerpoint/2010/main" xmlns="" val="740717268"/>
+        <p14:creationId xmlns:p14="http://schemas.microsoft.com/office/powerpoint/2010/main" val="740717268"/>
       </p:ext>
     </p:extLst>
   </p:cSld>
@@ -2119,7 +2130,7 @@
     </p:spTree>
     <p:extLst>
       <p:ext uri="{BB962C8B-B14F-4D97-AF65-F5344CB8AC3E}">
-        <p14:creationId xmlns:p14="http://schemas.microsoft.com/office/powerpoint/2010/main" xmlns="" val="2024142441"/>
+        <p14:creationId xmlns:p14="http://schemas.microsoft.com/office/powerpoint/2010/main" val="2024142441"/>
       </p:ext>
     </p:extLst>
   </p:cSld>
@@ -2804,7 +2815,7 @@
     </p:spTree>
     <p:extLst>
       <p:ext uri="{BB962C8B-B14F-4D97-AF65-F5344CB8AC3E}">
-        <p14:creationId xmlns:p14="http://schemas.microsoft.com/office/powerpoint/2010/main" xmlns="" val="503585301"/>
+        <p14:creationId xmlns:p14="http://schemas.microsoft.com/office/powerpoint/2010/main" val="503585301"/>
       </p:ext>
     </p:extLst>
   </p:cSld>
@@ -2959,7 +2970,7 @@
     </p:spTree>
     <p:extLst>
       <p:ext uri="{BB962C8B-B14F-4D97-AF65-F5344CB8AC3E}">
-        <p14:creationId xmlns:p14="http://schemas.microsoft.com/office/powerpoint/2010/main" xmlns="" val="272421617"/>
+        <p14:creationId xmlns:p14="http://schemas.microsoft.com/office/powerpoint/2010/main" val="272421617"/>
       </p:ext>
     </p:extLst>
   </p:cSld>
@@ -14842,7 +14853,7 @@
     </p:spTree>
     <p:extLst>
       <p:ext uri="{BB962C8B-B14F-4D97-AF65-F5344CB8AC3E}">
-        <p14:creationId xmlns:p14="http://schemas.microsoft.com/office/powerpoint/2010/main" xmlns="" val="525101080"/>
+        <p14:creationId xmlns:p14="http://schemas.microsoft.com/office/powerpoint/2010/main" val="525101080"/>
       </p:ext>
     </p:extLst>
   </p:cSld>
@@ -14946,13 +14957,20 @@
     </p:spTree>
     <p:extLst>
       <p:ext uri="{BB962C8B-B14F-4D97-AF65-F5344CB8AC3E}">
-        <p14:creationId xmlns:p14="http://schemas.microsoft.com/office/powerpoint/2010/main" xmlns="" val="1320246722"/>
+        <p14:creationId xmlns:p14="http://schemas.microsoft.com/office/powerpoint/2010/main" val="1320246722"/>
       </p:ext>
     </p:extLst>
   </p:cSld>
   <p:clrMapOvr>
     <a:masterClrMapping/>
   </p:clrMapOvr>
+  <p:timing>
+    <p:tnLst>
+      <p:par>
+        <p:cTn id="1" dur="indefinite" restart="never" nodeType="tmRoot"/>
+      </p:par>
+    </p:tnLst>
+  </p:timing>
 </p:sld>
 </file>
 
@@ -14985,7 +15003,7 @@
         </p:nvSpPr>
         <p:spPr>
           <a:xfrm>
-            <a:off x="311700" y="1302275"/>
+            <a:off x="311701" y="638395"/>
             <a:ext cx="8520600" cy="572700"/>
           </a:xfrm>
           <a:prstGeom prst="rect">
@@ -14999,7 +15017,7 @@
           <a:lstStyle/>
           <a:p>
             <a:r>
-              <a:rPr lang="en"/>
+              <a:rPr lang="en" dirty="0"/>
               <a:t>Test results</a:t>
             </a:r>
           </a:p>
@@ -15017,8 +15035,8 @@
         </p:nvSpPr>
         <p:spPr>
           <a:xfrm>
-            <a:off x="311700" y="2009725"/>
-            <a:ext cx="8520600" cy="3416400"/>
+            <a:off x="563673" y="1299212"/>
+            <a:ext cx="6953257" cy="3416400"/>
           </a:xfrm>
           <a:prstGeom prst="rect">
             <a:avLst/>
@@ -15038,8 +15056,8 @@
               <a:buNone/>
             </a:pPr>
             <a:r>
-              <a:rPr lang="en"/>
-              <a:t>List test cases, success and failure.</a:t>
+              <a:rPr lang="en-US" dirty="0" smtClean="0"/>
+              <a:t>Pass: </a:t>
             </a:r>
           </a:p>
           <a:p>
@@ -15048,34 +15066,369 @@
                 <a:schemeClr val="dk1"/>
               </a:buClr>
               <a:buSzPct val="61111"/>
-              <a:buNone/>
             </a:pPr>
             <a:r>
-              <a:rPr lang="en"/>
-              <a:t>Characterize defects by priority and severity</a:t>
+              <a:rPr lang="en-US" sz="1600" dirty="0"/>
+              <a:t>Use correct information to sign up;</a:t>
             </a:r>
           </a:p>
           <a:p>
             <a:pPr>
-              <a:buNone/>
+              <a:buClr>
+                <a:schemeClr val="dk1"/>
+              </a:buClr>
+              <a:buSzPct val="61111"/>
             </a:pPr>
             <a:r>
-              <a:rPr lang="en"/>
-              <a:t>Recommended:  Monkey test, farm test, etc.</a:t>
+              <a:rPr lang="en-US" sz="1600" dirty="0"/>
+              <a:t>Use username and password to sign in;</a:t>
             </a:r>
+          </a:p>
+          <a:p>
+            <a:pPr>
+              <a:buClr>
+                <a:schemeClr val="dk1"/>
+              </a:buClr>
+              <a:buSzPct val="61111"/>
+            </a:pPr>
+            <a:r>
+              <a:rPr lang="en-US" sz="1600" dirty="0"/>
+              <a:t>Jump from sign in page to video chat page</a:t>
+            </a:r>
+            <a:r>
+              <a:rPr lang="en-US" sz="1600" dirty="0" smtClean="0"/>
+              <a:t>;</a:t>
+            </a:r>
+          </a:p>
+          <a:p>
+            <a:pPr>
+              <a:buClr>
+                <a:schemeClr val="dk1"/>
+              </a:buClr>
+              <a:buSzPct val="61111"/>
+            </a:pPr>
+            <a:r>
+              <a:rPr lang="en-US" sz="1600" dirty="0" smtClean="0"/>
+              <a:t>Create </a:t>
+            </a:r>
+            <a:r>
+              <a:rPr lang="en-US" sz="1800" dirty="0"/>
+              <a:t>a room and add it </a:t>
+            </a:r>
+            <a:r>
+              <a:rPr lang="en-US" sz="1800" dirty="0" smtClean="0"/>
+              <a:t>to the </a:t>
+            </a:r>
+            <a:r>
+              <a:rPr lang="en-US" sz="1800" dirty="0"/>
+              <a:t>favorite list;</a:t>
+            </a:r>
+          </a:p>
+          <a:p>
+            <a:pPr>
+              <a:buClr>
+                <a:schemeClr val="dk1"/>
+              </a:buClr>
+              <a:buSzPct val="61111"/>
+            </a:pPr>
+            <a:r>
+              <a:rPr lang="en-US" sz="1800" dirty="0"/>
+              <a:t>Set preference in </a:t>
+            </a:r>
+            <a:r>
+              <a:rPr lang="en-US" sz="1800" dirty="0" smtClean="0"/>
+              <a:t>setting.</a:t>
+            </a:r>
+            <a:endParaRPr lang="en-US" sz="1800" dirty="0"/>
+          </a:p>
+          <a:p>
+            <a:pPr>
+              <a:buClr>
+                <a:schemeClr val="dk1"/>
+              </a:buClr>
+              <a:buSzPct val="61111"/>
+              <a:buNone/>
+            </a:pPr>
+            <a:endParaRPr lang="en-US" sz="1600" dirty="0" smtClean="0"/>
+          </a:p>
+          <a:p>
+            <a:pPr>
+              <a:buClr>
+                <a:schemeClr val="dk1"/>
+              </a:buClr>
+              <a:buSzPct val="61111"/>
+              <a:buNone/>
+            </a:pPr>
+            <a:endParaRPr lang="en-US" sz="1600" dirty="0" smtClean="0"/>
+          </a:p>
+        </p:txBody>
+      </p:sp>
+      <p:sp>
+        <p:nvSpPr>
+          <p:cNvPr id="4" name="文本框 3"/>
+          <p:cNvSpPr txBox="1"/>
+          <p:nvPr/>
+        </p:nvSpPr>
+        <p:spPr>
+          <a:xfrm>
+            <a:off x="563673" y="3141736"/>
+            <a:ext cx="5867271" cy="1661993"/>
+          </a:xfrm>
+          <a:prstGeom prst="rect">
+            <a:avLst/>
+          </a:prstGeom>
+          <a:noFill/>
+        </p:spPr>
+        <p:txBody>
+          <a:bodyPr wrap="square" rtlCol="0">
+            <a:spAutoFit/>
+          </a:bodyPr>
+          <a:lstStyle/>
+          <a:p>
+            <a:r>
+              <a:rPr kumimoji="1" lang="en-US" altLang="zh-CN" dirty="0" smtClean="0"/>
+              <a:t> </a:t>
+            </a:r>
+            <a:r>
+              <a:rPr kumimoji="1" lang="en-US" altLang="zh-CN" sz="2400" dirty="0" smtClean="0"/>
+              <a:t>Fail:</a:t>
+            </a:r>
+          </a:p>
+          <a:p>
+            <a:pPr marL="342900" indent="-190500">
+              <a:buClr>
+                <a:schemeClr val="dk1"/>
+              </a:buClr>
+              <a:buSzPct val="61111"/>
+              <a:buFont typeface="Noto Sans Symbols"/>
+              <a:buChar char="▪"/>
+            </a:pPr>
+            <a:r>
+              <a:rPr lang="en-US" altLang="zh-CN" sz="1600" dirty="0">
+                <a:solidFill>
+                  <a:schemeClr val="dk1"/>
+                </a:solidFill>
+              </a:rPr>
+              <a:t>User uses a wrong email address</a:t>
+            </a:r>
+            <a:r>
+              <a:rPr lang="en-US" altLang="zh-CN" sz="1600" dirty="0">
+                <a:solidFill>
+                  <a:schemeClr val="dk1"/>
+                </a:solidFill>
+              </a:rPr>
+              <a:t>or a email address that already exists to </a:t>
+            </a:r>
+            <a:r>
+              <a:rPr lang="en-US" altLang="zh-CN" sz="1600" dirty="0">
+                <a:solidFill>
+                  <a:schemeClr val="dk1"/>
+                </a:solidFill>
+              </a:rPr>
+              <a:t>sign </a:t>
+            </a:r>
+            <a:r>
+              <a:rPr lang="en-US" altLang="zh-CN" sz="1600" dirty="0">
+                <a:solidFill>
+                  <a:schemeClr val="dk1"/>
+                </a:solidFill>
+              </a:rPr>
+              <a:t>up</a:t>
+            </a:r>
+            <a:r>
+              <a:rPr lang="en-US" altLang="zh-CN" sz="1600" dirty="0" smtClean="0">
+                <a:solidFill>
+                  <a:schemeClr val="dk1"/>
+                </a:solidFill>
+              </a:rPr>
+              <a:t>;</a:t>
+            </a:r>
+          </a:p>
+          <a:p>
+            <a:pPr marL="342900" indent="-190500">
+              <a:buClr>
+                <a:schemeClr val="dk1"/>
+              </a:buClr>
+              <a:buSzPct val="61111"/>
+              <a:buFont typeface="Noto Sans Symbols"/>
+              <a:buChar char="▪"/>
+            </a:pPr>
+            <a:r>
+              <a:rPr lang="en-US" altLang="zh-CN" sz="1600" dirty="0">
+                <a:solidFill>
+                  <a:schemeClr val="dk1"/>
+                </a:solidFill>
+              </a:rPr>
+              <a:t>clicks the button to begin a </a:t>
+            </a:r>
+            <a:r>
+              <a:rPr lang="en-US" altLang="zh-CN" sz="1600" dirty="0" smtClean="0">
+                <a:solidFill>
+                  <a:schemeClr val="dk1"/>
+                </a:solidFill>
+              </a:rPr>
+              <a:t>vide chat.</a:t>
+            </a:r>
+            <a:endParaRPr lang="en-US" altLang="zh-CN" sz="1600" dirty="0">
+              <a:solidFill>
+                <a:schemeClr val="dk1"/>
+              </a:solidFill>
+            </a:endParaRPr>
+          </a:p>
+          <a:p>
+            <a:endParaRPr kumimoji="1" lang="en-US" altLang="zh-CN" sz="1600" dirty="0" smtClean="0"/>
+          </a:p>
+          <a:p>
+            <a:endParaRPr kumimoji="1" lang="zh-CN" altLang="en-US" dirty="0"/>
+          </a:p>
+        </p:txBody>
+      </p:sp>
+      <p:sp>
+        <p:nvSpPr>
+          <p:cNvPr id="5" name="矩形 4"/>
+          <p:cNvSpPr/>
+          <p:nvPr/>
+        </p:nvSpPr>
+        <p:spPr>
+          <a:xfrm>
+            <a:off x="563673" y="4473038"/>
+            <a:ext cx="5507778" cy="1354217"/>
+          </a:xfrm>
+          <a:prstGeom prst="rect">
+            <a:avLst/>
+          </a:prstGeom>
+        </p:spPr>
+        <p:txBody>
+          <a:bodyPr wrap="square">
+            <a:spAutoFit/>
+          </a:bodyPr>
+          <a:lstStyle/>
+          <a:p>
+            <a:r>
+              <a:rPr kumimoji="1" lang="en-US" altLang="zh-CN" sz="2000" dirty="0" smtClean="0"/>
+              <a:t>Not run:</a:t>
+            </a:r>
+            <a:endParaRPr kumimoji="1" lang="en-US" altLang="zh-CN" sz="2000" dirty="0"/>
+          </a:p>
+          <a:p>
+            <a:pPr marL="342900" indent="-190500">
+              <a:buClr>
+                <a:schemeClr val="dk1"/>
+              </a:buClr>
+              <a:buSzPct val="61111"/>
+              <a:buFont typeface="Noto Sans Symbols"/>
+              <a:buChar char="▪"/>
+            </a:pPr>
+            <a:r>
+              <a:rPr lang="en-US" altLang="zh-CN" sz="1600" dirty="0">
+                <a:solidFill>
+                  <a:schemeClr val="dk1"/>
+                </a:solidFill>
+              </a:rPr>
+              <a:t>Invite the third people to the room;</a:t>
+            </a:r>
+            <a:endParaRPr lang="en-US" altLang="zh-CN" sz="1600" dirty="0">
+              <a:solidFill>
+                <a:schemeClr val="dk1"/>
+              </a:solidFill>
+            </a:endParaRPr>
+          </a:p>
+          <a:p>
+            <a:pPr marL="342900" indent="-190500">
+              <a:buClr>
+                <a:schemeClr val="dk1"/>
+              </a:buClr>
+              <a:buSzPct val="61111"/>
+              <a:buFont typeface="Noto Sans Symbols"/>
+              <a:buChar char="▪"/>
+            </a:pPr>
+            <a:r>
+              <a:rPr lang="en-US" altLang="zh-CN" sz="1600" dirty="0">
+                <a:solidFill>
+                  <a:schemeClr val="dk1"/>
+                </a:solidFill>
+              </a:rPr>
+              <a:t>The microphone button ,the stop the video call </a:t>
+            </a:r>
+            <a:r>
+              <a:rPr lang="en-US" altLang="zh-CN" sz="1600" dirty="0" smtClean="0">
+                <a:solidFill>
+                  <a:schemeClr val="dk1"/>
+                </a:solidFill>
+              </a:rPr>
+              <a:t>button;</a:t>
+            </a:r>
+            <a:endParaRPr lang="en-US" altLang="zh-CN" sz="1600" dirty="0">
+              <a:solidFill>
+                <a:schemeClr val="dk1"/>
+              </a:solidFill>
+            </a:endParaRPr>
+          </a:p>
+          <a:p>
+            <a:pPr marL="342900" indent="-190500">
+              <a:buClr>
+                <a:schemeClr val="dk1"/>
+              </a:buClr>
+              <a:buSzPct val="61111"/>
+              <a:buFont typeface="Noto Sans Symbols"/>
+              <a:buChar char="▪"/>
+            </a:pPr>
+            <a:r>
+              <a:rPr lang="en-US" altLang="zh-CN" sz="1600" dirty="0">
+                <a:solidFill>
+                  <a:schemeClr val="dk1"/>
+                </a:solidFill>
+              </a:rPr>
+              <a:t>The dual camera </a:t>
+            </a:r>
+            <a:r>
+              <a:rPr lang="en-US" altLang="zh-CN" sz="1600" dirty="0" smtClean="0">
+                <a:solidFill>
+                  <a:schemeClr val="dk1"/>
+                </a:solidFill>
+              </a:rPr>
+              <a:t>button.</a:t>
+            </a:r>
+            <a:endParaRPr lang="en-US" altLang="zh-CN" sz="1600" dirty="0">
+              <a:solidFill>
+                <a:schemeClr val="dk1"/>
+              </a:solidFill>
+            </a:endParaRPr>
+          </a:p>
+          <a:p>
+            <a:pPr marL="342900" indent="-190500">
+              <a:buClr>
+                <a:schemeClr val="dk1"/>
+              </a:buClr>
+              <a:buSzPct val="61111"/>
+              <a:buFont typeface="Noto Sans Symbols"/>
+              <a:buChar char="▪"/>
+            </a:pPr>
+            <a:endParaRPr lang="en-US" altLang="zh-CN" dirty="0">
+              <a:solidFill>
+                <a:schemeClr val="dk1"/>
+              </a:solidFill>
+            </a:endParaRPr>
           </a:p>
         </p:txBody>
       </p:sp>
     </p:spTree>
     <p:extLst>
       <p:ext uri="{BB962C8B-B14F-4D97-AF65-F5344CB8AC3E}">
-        <p14:creationId xmlns:p14="http://schemas.microsoft.com/office/powerpoint/2010/main" xmlns="" val="1321015327"/>
+        <p14:creationId xmlns:p14="http://schemas.microsoft.com/office/powerpoint/2010/main" val="1321015327"/>
       </p:ext>
     </p:extLst>
   </p:cSld>
   <p:clrMapOvr>
     <a:masterClrMapping/>
   </p:clrMapOvr>
+  <p:timing>
+    <p:tnLst>
+      <p:par>
+        <p:cTn id="1" dur="indefinite" restart="never" nodeType="tmRoot"/>
+      </p:par>
+    </p:tnLst>
+  </p:timing>
 </p:sld>
 </file>
 
@@ -15166,11 +15519,7 @@
             </a:r>
             <a:r>
               <a:rPr lang="en" dirty="0" smtClean="0"/>
-              <a:t>three</a:t>
-            </a:r>
-            <a:r>
-              <a:rPr lang="en" dirty="0" smtClean="0"/>
-              <a:t> </a:t>
+              <a:t>three </a:t>
             </a:r>
             <a:r>
               <a:rPr lang="en" dirty="0"/>
@@ -15304,13 +15653,20 @@
     </p:spTree>
     <p:extLst>
       <p:ext uri="{BB962C8B-B14F-4D97-AF65-F5344CB8AC3E}">
-        <p14:creationId xmlns:p14="http://schemas.microsoft.com/office/powerpoint/2010/main" xmlns="" val="465577625"/>
+        <p14:creationId xmlns:p14="http://schemas.microsoft.com/office/powerpoint/2010/main" val="465577625"/>
       </p:ext>
     </p:extLst>
   </p:cSld>
   <p:clrMapOvr>
     <a:masterClrMapping/>
   </p:clrMapOvr>
+  <p:timing>
+    <p:tnLst>
+      <p:par>
+        <p:cTn id="1" dur="indefinite" restart="never" nodeType="tmRoot"/>
+      </p:par>
+    </p:tnLst>
+  </p:timing>
 </p:sld>
 </file>
 
@@ -15378,11 +15734,7 @@
             </a:pPr>
             <a:r>
               <a:rPr lang="en" dirty="0" smtClean="0"/>
-              <a:t>Top three things that did not go </a:t>
-            </a:r>
-            <a:r>
-              <a:rPr lang="en" dirty="0" smtClean="0"/>
-              <a:t>well:</a:t>
+              <a:t>Top three things that did not go well:</a:t>
             </a:r>
           </a:p>
           <a:p>
@@ -15420,7 +15772,6 @@
               <a:rPr lang="en" sz="1800" dirty="0" smtClean="0"/>
               <a:t>Unable to implement inviting friends.</a:t>
             </a:r>
-            <a:endParaRPr lang="en" sz="1800" dirty="0" smtClean="0"/>
           </a:p>
           <a:p>
             <a:pPr>
@@ -15432,11 +15783,7 @@
             </a:pPr>
             <a:r>
               <a:rPr lang="en" dirty="0" smtClean="0"/>
-              <a:t>One thing you as a team will do differently in the </a:t>
-            </a:r>
-            <a:r>
-              <a:rPr lang="en" dirty="0" smtClean="0"/>
-              <a:t>future:</a:t>
+              <a:t>One thing you as a team will do differently in the future:</a:t>
             </a:r>
           </a:p>
           <a:p>
@@ -15451,7 +15798,6 @@
               <a:rPr lang="en" sz="1800" dirty="0" smtClean="0"/>
               <a:t>Make effecient use of GitHub to work individually without having the need to meet regularly.</a:t>
             </a:r>
-            <a:endParaRPr lang="en" sz="1800" dirty="0" smtClean="0"/>
           </a:p>
           <a:p>
             <a:pPr>
@@ -15463,11 +15809,7 @@
             </a:pPr>
             <a:r>
               <a:rPr lang="en" dirty="0" smtClean="0"/>
-              <a:t>Any future plans for your </a:t>
-            </a:r>
-            <a:r>
-              <a:rPr lang="en" dirty="0" smtClean="0"/>
-              <a:t>project:</a:t>
+              <a:t>Any future plans for your project:</a:t>
             </a:r>
           </a:p>
           <a:p>
@@ -15482,7 +15824,6 @@
               <a:rPr lang="en" sz="1800" dirty="0" smtClean="0"/>
               <a:t>Try to implement dual camera feature on devices which have the hardware capability to support the function</a:t>
             </a:r>
-            <a:endParaRPr lang="en" sz="1800" dirty="0" smtClean="0"/>
           </a:p>
           <a:p>
             <a:endParaRPr lang="en-IN" dirty="0"/>
@@ -15670,7 +16011,7 @@
     </p:spTree>
     <p:extLst>
       <p:ext uri="{BB962C8B-B14F-4D97-AF65-F5344CB8AC3E}">
-        <p14:creationId xmlns:p14="http://schemas.microsoft.com/office/powerpoint/2010/main" xmlns="" val="3110628"/>
+        <p14:creationId xmlns:p14="http://schemas.microsoft.com/office/powerpoint/2010/main" val="3110628"/>
       </p:ext>
     </p:extLst>
   </p:cSld>
@@ -16706,7 +17047,7 @@
     </p:spTree>
     <p:extLst>
       <p:ext uri="{BB962C8B-B14F-4D97-AF65-F5344CB8AC3E}">
-        <p14:creationId xmlns:p14="http://schemas.microsoft.com/office/powerpoint/2010/main" xmlns="" val="154981515"/>
+        <p14:creationId xmlns:p14="http://schemas.microsoft.com/office/powerpoint/2010/main" val="154981515"/>
       </p:ext>
     </p:extLst>
   </p:cSld>

</xml_diff>